<commit_message>
updated the workflow diagram
</commit_message>
<xml_diff>
--- a/doc/diagrams/workflow.pptx
+++ b/doc/diagrams/workflow.pptx
@@ -8,9 +8,9 @@
     <p:notesMasterId r:id="rId3"/>
   </p:notesMasterIdLst>
   <p:sldIdLst>
-    <p:sldId id="256" r:id="rId2"/>
+    <p:sldId id="258" r:id="rId2"/>
   </p:sldIdLst>
-  <p:sldSz cx="9144000" cy="3932238"/>
+  <p:sldSz cx="9144000" cy="5715000" type="screen16x10"/>
   <p:notesSz cx="6858000" cy="9144000"/>
   <p:defaultTextStyle>
     <a:defPPr>
@@ -107,6 +107,22 @@
       </a:defRPr>
     </a:lvl9pPr>
   </p:defaultTextStyle>
+  <p:extLst>
+    <p:ext uri="{EFAFB233-063F-42B5-8137-9DF3F51BA10A}">
+      <p15:sldGuideLst xmlns:p15="http://schemas.microsoft.com/office/powerpoint/2012/main">
+        <p15:guide id="1" orient="horz" pos="1801" userDrawn="1">
+          <p15:clr>
+            <a:srgbClr val="A4A3A4"/>
+          </p15:clr>
+        </p15:guide>
+        <p15:guide id="2" pos="2881" userDrawn="1">
+          <p15:clr>
+            <a:srgbClr val="A4A3A4"/>
+          </p15:clr>
+        </p15:guide>
+      </p15:sldGuideLst>
+    </p:ext>
+  </p:extLst>
 </p:presentation>
 </file>
 
@@ -193,7 +209,7 @@
             <a:fld id="{DC50A2AC-D691-437C-A69B-81ECFE08AD4B}" type="datetimeFigureOut">
               <a:rPr lang="en-SG" smtClean="0"/>
               <a:pPr/>
-              <a:t>6/5/2014</a:t>
+              <a:t>10/2/2016</a:t>
             </a:fld>
             <a:endParaRPr lang="en-SG"/>
           </a:p>
@@ -211,8 +227,8 @@
         </p:nvSpPr>
         <p:spPr>
           <a:xfrm>
-            <a:off x="-557213" y="685800"/>
-            <a:ext cx="7972426" cy="3429000"/>
+            <a:off x="685800" y="685800"/>
+            <a:ext cx="5486400" cy="3429000"/>
           </a:xfrm>
           <a:prstGeom prst="rect">
             <a:avLst/>
@@ -491,8 +507,8 @@
         </p:nvSpPr>
         <p:spPr>
           <a:xfrm>
-            <a:off x="-557213" y="685800"/>
-            <a:ext cx="7972426" cy="3429000"/>
+            <a:off x="685800" y="685800"/>
+            <a:ext cx="5486400" cy="3429000"/>
           </a:xfrm>
         </p:spPr>
       </p:sp>
@@ -542,7 +558,7 @@
     </p:spTree>
     <p:extLst>
       <p:ext uri="{BB962C8B-B14F-4D97-AF65-F5344CB8AC3E}">
-        <p14:creationId xmlns:p14="http://schemas.microsoft.com/office/powerpoint/2010/main" val="1558229004"/>
+        <p14:creationId xmlns:p14="http://schemas.microsoft.com/office/powerpoint/2010/main" val="3134786504"/>
       </p:ext>
     </p:extLst>
   </p:cSld>
@@ -581,8 +597,8 @@
         </p:nvSpPr>
         <p:spPr>
           <a:xfrm>
-            <a:off x="685802" y="1221543"/>
-            <a:ext cx="7772400" cy="842883"/>
+            <a:off x="685802" y="1775355"/>
+            <a:ext cx="7772400" cy="1225022"/>
           </a:xfrm>
         </p:spPr>
         <p:txBody>
@@ -609,8 +625,8 @@
         </p:nvSpPr>
         <p:spPr>
           <a:xfrm>
-            <a:off x="1371601" y="2228268"/>
-            <a:ext cx="6400800" cy="1004905"/>
+            <a:off x="1371601" y="3238500"/>
+            <a:ext cx="6400800" cy="1460500"/>
           </a:xfrm>
         </p:spPr>
         <p:txBody>
@@ -734,7 +750,7 @@
             <a:fld id="{1D8BD707-D9CF-40AE-B4C6-C98DA3205C09}" type="datetimeFigureOut">
               <a:rPr lang="en-US" smtClean="0"/>
               <a:pPr/>
-              <a:t>5/6/2014</a:t>
+              <a:t>2/10/2016</a:t>
             </a:fld>
             <a:endParaRPr lang="en-US"/>
           </a:p>
@@ -901,7 +917,7 @@
             <a:fld id="{1D8BD707-D9CF-40AE-B4C6-C98DA3205C09}" type="datetimeFigureOut">
               <a:rPr lang="en-US" smtClean="0"/>
               <a:pPr/>
-              <a:t>5/6/2014</a:t>
+              <a:t>2/10/2016</a:t>
             </a:fld>
             <a:endParaRPr lang="en-US"/>
           </a:p>
@@ -987,8 +1003,8 @@
         </p:nvSpPr>
         <p:spPr>
           <a:xfrm>
-            <a:off x="6629401" y="157474"/>
-            <a:ext cx="2057400" cy="3355146"/>
+            <a:off x="6629401" y="228868"/>
+            <a:ext cx="2057400" cy="4876271"/>
           </a:xfrm>
         </p:spPr>
         <p:txBody>
@@ -1015,8 +1031,8 @@
         </p:nvSpPr>
         <p:spPr>
           <a:xfrm>
-            <a:off x="457201" y="157474"/>
-            <a:ext cx="6019800" cy="3355146"/>
+            <a:off x="457201" y="228868"/>
+            <a:ext cx="6019800" cy="4876271"/>
           </a:xfrm>
         </p:spPr>
         <p:txBody>
@@ -1078,7 +1094,7 @@
             <a:fld id="{1D8BD707-D9CF-40AE-B4C6-C98DA3205C09}" type="datetimeFigureOut">
               <a:rPr lang="en-US" smtClean="0"/>
               <a:pPr/>
-              <a:t>5/6/2014</a:t>
+              <a:t>2/10/2016</a:t>
             </a:fld>
             <a:endParaRPr lang="en-US"/>
           </a:p>
@@ -1245,7 +1261,7 @@
             <a:fld id="{1D8BD707-D9CF-40AE-B4C6-C98DA3205C09}" type="datetimeFigureOut">
               <a:rPr lang="en-US" smtClean="0"/>
               <a:pPr/>
-              <a:t>5/6/2014</a:t>
+              <a:t>2/10/2016</a:t>
             </a:fld>
             <a:endParaRPr lang="en-US"/>
           </a:p>
@@ -1331,8 +1347,8 @@
         </p:nvSpPr>
         <p:spPr>
           <a:xfrm>
-            <a:off x="722314" y="2526828"/>
-            <a:ext cx="7772400" cy="780986"/>
+            <a:off x="722314" y="3672418"/>
+            <a:ext cx="7772400" cy="1135062"/>
           </a:xfrm>
         </p:spPr>
         <p:txBody>
@@ -1363,8 +1379,8 @@
         </p:nvSpPr>
         <p:spPr>
           <a:xfrm>
-            <a:off x="722314" y="1666651"/>
-            <a:ext cx="7772400" cy="860178"/>
+            <a:off x="722314" y="2422262"/>
+            <a:ext cx="7772400" cy="1250158"/>
           </a:xfrm>
         </p:spPr>
         <p:txBody>
@@ -1488,7 +1504,7 @@
             <a:fld id="{1D8BD707-D9CF-40AE-B4C6-C98DA3205C09}" type="datetimeFigureOut">
               <a:rPr lang="en-US" smtClean="0"/>
               <a:pPr/>
-              <a:t>5/6/2014</a:t>
+              <a:t>2/10/2016</a:t>
             </a:fld>
             <a:endParaRPr lang="en-US"/>
           </a:p>
@@ -1597,8 +1613,8 @@
         </p:nvSpPr>
         <p:spPr>
           <a:xfrm>
-            <a:off x="457202" y="917523"/>
-            <a:ext cx="4038600" cy="2595096"/>
+            <a:off x="457202" y="1333501"/>
+            <a:ext cx="4038600" cy="3771637"/>
           </a:xfrm>
         </p:spPr>
         <p:txBody>
@@ -1682,8 +1698,8 @@
         </p:nvSpPr>
         <p:spPr>
           <a:xfrm>
-            <a:off x="4648201" y="917523"/>
-            <a:ext cx="4038600" cy="2595096"/>
+            <a:off x="4648201" y="1333501"/>
+            <a:ext cx="4038600" cy="3771637"/>
           </a:xfrm>
         </p:spPr>
         <p:txBody>
@@ -1773,7 +1789,7 @@
             <a:fld id="{1D8BD707-D9CF-40AE-B4C6-C98DA3205C09}" type="datetimeFigureOut">
               <a:rPr lang="en-US" smtClean="0"/>
               <a:pPr/>
-              <a:t>5/6/2014</a:t>
+              <a:t>2/10/2016</a:t>
             </a:fld>
             <a:endParaRPr lang="en-US"/>
           </a:p>
@@ -1886,8 +1902,8 @@
         </p:nvSpPr>
         <p:spPr>
           <a:xfrm>
-            <a:off x="457204" y="880203"/>
-            <a:ext cx="4040189" cy="366827"/>
+            <a:off x="457205" y="1279262"/>
+            <a:ext cx="4040189" cy="533136"/>
           </a:xfrm>
         </p:spPr>
         <p:txBody>
@@ -1951,8 +1967,8 @@
         </p:nvSpPr>
         <p:spPr>
           <a:xfrm>
-            <a:off x="457204" y="1247030"/>
-            <a:ext cx="4040189" cy="2265589"/>
+            <a:off x="457205" y="1812398"/>
+            <a:ext cx="4040189" cy="3292741"/>
           </a:xfrm>
         </p:spPr>
         <p:txBody>
@@ -2036,8 +2052,8 @@
         </p:nvSpPr>
         <p:spPr>
           <a:xfrm>
-            <a:off x="4645028" y="880203"/>
-            <a:ext cx="4041774" cy="366827"/>
+            <a:off x="4645028" y="1279262"/>
+            <a:ext cx="4041774" cy="533136"/>
           </a:xfrm>
         </p:spPr>
         <p:txBody>
@@ -2101,8 +2117,8 @@
         </p:nvSpPr>
         <p:spPr>
           <a:xfrm>
-            <a:off x="4645028" y="1247030"/>
-            <a:ext cx="4041774" cy="2265589"/>
+            <a:off x="4645028" y="1812398"/>
+            <a:ext cx="4041774" cy="3292741"/>
           </a:xfrm>
         </p:spPr>
         <p:txBody>
@@ -2192,7 +2208,7 @@
             <a:fld id="{1D8BD707-D9CF-40AE-B4C6-C98DA3205C09}" type="datetimeFigureOut">
               <a:rPr lang="en-US" smtClean="0"/>
               <a:pPr/>
-              <a:t>5/6/2014</a:t>
+              <a:t>2/10/2016</a:t>
             </a:fld>
             <a:endParaRPr lang="en-US"/>
           </a:p>
@@ -2307,7 +2323,7 @@
             <a:fld id="{1D8BD707-D9CF-40AE-B4C6-C98DA3205C09}" type="datetimeFigureOut">
               <a:rPr lang="en-US" smtClean="0"/>
               <a:pPr/>
-              <a:t>5/6/2014</a:t>
+              <a:t>2/10/2016</a:t>
             </a:fld>
             <a:endParaRPr lang="en-US"/>
           </a:p>
@@ -2399,7 +2415,7 @@
             <a:fld id="{1D8BD707-D9CF-40AE-B4C6-C98DA3205C09}" type="datetimeFigureOut">
               <a:rPr lang="en-US" smtClean="0"/>
               <a:pPr/>
-              <a:t>5/6/2014</a:t>
+              <a:t>2/10/2016</a:t>
             </a:fld>
             <a:endParaRPr lang="en-US"/>
           </a:p>
@@ -2485,8 +2501,8 @@
         </p:nvSpPr>
         <p:spPr>
           <a:xfrm>
-            <a:off x="457201" y="156561"/>
-            <a:ext cx="3008314" cy="666296"/>
+            <a:off x="457201" y="227541"/>
+            <a:ext cx="3008314" cy="968375"/>
           </a:xfrm>
         </p:spPr>
         <p:txBody>
@@ -2517,8 +2533,8 @@
         </p:nvSpPr>
         <p:spPr>
           <a:xfrm>
-            <a:off x="3575053" y="156562"/>
-            <a:ext cx="5111751" cy="3356056"/>
+            <a:off x="3575054" y="227543"/>
+            <a:ext cx="5111751" cy="4877594"/>
           </a:xfrm>
         </p:spPr>
         <p:txBody>
@@ -2602,8 +2618,8 @@
         </p:nvSpPr>
         <p:spPr>
           <a:xfrm>
-            <a:off x="457201" y="822857"/>
-            <a:ext cx="3008314" cy="2689760"/>
+            <a:off x="457201" y="1195916"/>
+            <a:ext cx="3008314" cy="3909219"/>
           </a:xfrm>
         </p:spPr>
         <p:txBody>
@@ -2673,7 +2689,7 @@
             <a:fld id="{1D8BD707-D9CF-40AE-B4C6-C98DA3205C09}" type="datetimeFigureOut">
               <a:rPr lang="en-US" smtClean="0"/>
               <a:pPr/>
-              <a:t>5/6/2014</a:t>
+              <a:t>2/10/2016</a:t>
             </a:fld>
             <a:endParaRPr lang="en-US"/>
           </a:p>
@@ -2759,8 +2775,8 @@
         </p:nvSpPr>
         <p:spPr>
           <a:xfrm>
-            <a:off x="1792288" y="2752567"/>
-            <a:ext cx="5486400" cy="324956"/>
+            <a:off x="1792288" y="4000500"/>
+            <a:ext cx="5486400" cy="472282"/>
           </a:xfrm>
         </p:spPr>
         <p:txBody>
@@ -2791,8 +2807,8 @@
         </p:nvSpPr>
         <p:spPr>
           <a:xfrm>
-            <a:off x="1792288" y="351355"/>
-            <a:ext cx="5486400" cy="2359343"/>
+            <a:off x="1792288" y="510650"/>
+            <a:ext cx="5486400" cy="3429000"/>
           </a:xfrm>
         </p:spPr>
         <p:txBody>
@@ -2852,8 +2868,8 @@
         </p:nvSpPr>
         <p:spPr>
           <a:xfrm>
-            <a:off x="1792288" y="3077526"/>
-            <a:ext cx="5486400" cy="461490"/>
+            <a:off x="1792288" y="4472787"/>
+            <a:ext cx="5486400" cy="670716"/>
           </a:xfrm>
         </p:spPr>
         <p:txBody>
@@ -2923,7 +2939,7 @@
             <a:fld id="{1D8BD707-D9CF-40AE-B4C6-C98DA3205C09}" type="datetimeFigureOut">
               <a:rPr lang="en-US" smtClean="0"/>
               <a:pPr/>
-              <a:t>5/6/2014</a:t>
+              <a:t>2/10/2016</a:t>
             </a:fld>
             <a:endParaRPr lang="en-US"/>
           </a:p>
@@ -3014,8 +3030,8 @@
         </p:nvSpPr>
         <p:spPr>
           <a:xfrm>
-            <a:off x="457202" y="157472"/>
-            <a:ext cx="8229600" cy="655373"/>
+            <a:off x="457202" y="228866"/>
+            <a:ext cx="8229600" cy="952500"/>
           </a:xfrm>
           <a:prstGeom prst="rect">
             <a:avLst/>
@@ -3047,8 +3063,8 @@
         </p:nvSpPr>
         <p:spPr>
           <a:xfrm>
-            <a:off x="457202" y="917523"/>
-            <a:ext cx="8229600" cy="2595096"/>
+            <a:off x="457202" y="1333501"/>
+            <a:ext cx="8229600" cy="3771637"/>
           </a:xfrm>
           <a:prstGeom prst="rect">
             <a:avLst/>
@@ -3109,8 +3125,8 @@
         </p:nvSpPr>
         <p:spPr>
           <a:xfrm>
-            <a:off x="457201" y="3644604"/>
-            <a:ext cx="2133600" cy="209355"/>
+            <a:off x="457201" y="5296962"/>
+            <a:ext cx="2133600" cy="304270"/>
           </a:xfrm>
           <a:prstGeom prst="rect">
             <a:avLst/>
@@ -3133,7 +3149,7 @@
             <a:fld id="{1D8BD707-D9CF-40AE-B4C6-C98DA3205C09}" type="datetimeFigureOut">
               <a:rPr lang="en-US" smtClean="0"/>
               <a:pPr/>
-              <a:t>5/6/2014</a:t>
+              <a:t>2/10/2016</a:t>
             </a:fld>
             <a:endParaRPr lang="en-US"/>
           </a:p>
@@ -3151,8 +3167,8 @@
         </p:nvSpPr>
         <p:spPr>
           <a:xfrm>
-            <a:off x="3124202" y="3644604"/>
-            <a:ext cx="2895600" cy="209355"/>
+            <a:off x="3124202" y="5296962"/>
+            <a:ext cx="2895600" cy="304270"/>
           </a:xfrm>
           <a:prstGeom prst="rect">
             <a:avLst/>
@@ -3188,8 +3204,8 @@
         </p:nvSpPr>
         <p:spPr>
           <a:xfrm>
-            <a:off x="6553201" y="3644604"/>
-            <a:ext cx="2133600" cy="209355"/>
+            <a:off x="6553201" y="5296962"/>
+            <a:ext cx="2133600" cy="304270"/>
           </a:xfrm>
           <a:prstGeom prst="rect">
             <a:avLst/>
@@ -3512,7 +3528,7 @@
         </p:nvSpPr>
         <p:spPr>
           <a:xfrm>
-            <a:off x="3276606" y="746919"/>
+            <a:off x="3294024" y="2049784"/>
             <a:ext cx="3874844" cy="1051917"/>
           </a:xfrm>
           <a:prstGeom prst="roundRect">
@@ -3562,7 +3578,7 @@
         </p:nvSpPr>
         <p:spPr bwMode="auto">
           <a:xfrm>
-            <a:off x="439781" y="901448"/>
+            <a:off x="457200" y="2204312"/>
             <a:ext cx="1272365" cy="988472"/>
           </a:xfrm>
           <a:custGeom>
@@ -3798,7 +3814,7 @@
         </p:nvSpPr>
         <p:spPr>
           <a:xfrm>
-            <a:off x="7923849" y="1427187"/>
+            <a:off x="7941268" y="2730051"/>
             <a:ext cx="1186265" cy="462732"/>
           </a:xfrm>
           <a:prstGeom prst="cloud">
@@ -3864,7 +3880,7 @@
         </p:nvSpPr>
         <p:spPr>
           <a:xfrm>
-            <a:off x="3352800" y="1508919"/>
+            <a:off x="3370218" y="2811783"/>
             <a:ext cx="3716382" cy="462732"/>
           </a:xfrm>
           <a:prstGeom prst="cloud">
@@ -3903,7 +3919,7 @@
           <a:p>
             <a:pPr algn="ctr"/>
             <a:r>
-              <a:rPr lang="en-US" sz="1400" b="1" dirty="0" err="1" smtClean="0">
+              <a:rPr lang="en-US" sz="1400" b="1" dirty="0" err="1">
                 <a:solidFill>
                   <a:schemeClr val="bg1">
                     <a:lumMod val="65000"/>
@@ -3930,7 +3946,7 @@
         </p:nvSpPr>
         <p:spPr>
           <a:xfrm>
-            <a:off x="5715000" y="902296"/>
+            <a:off x="5732419" y="2205160"/>
             <a:ext cx="1107933" cy="762000"/>
           </a:xfrm>
           <a:prstGeom prst="can">
@@ -3970,14 +3986,14 @@
           <a:p>
             <a:pPr algn="ctr"/>
             <a:r>
-              <a:rPr lang="en-US" sz="1600" b="1" dirty="0" smtClean="0"/>
+              <a:rPr lang="en-US" sz="1600" b="1" dirty="0"/>
               <a:t>Committer</a:t>
             </a:r>
           </a:p>
           <a:p>
             <a:pPr algn="ctr"/>
             <a:r>
-              <a:rPr lang="en-US" sz="1600" dirty="0" smtClean="0"/>
+              <a:rPr lang="en-US" sz="1600" dirty="0"/>
               <a:t>Repo</a:t>
             </a:r>
           </a:p>
@@ -4018,7 +4034,7 @@
         </p:blipFill>
         <p:spPr bwMode="auto">
           <a:xfrm>
-            <a:off x="8040732" y="673696"/>
+            <a:off x="8058150" y="1976560"/>
             <a:ext cx="1085850" cy="1085850"/>
           </a:xfrm>
           <a:prstGeom prst="rect">
@@ -4035,7 +4051,7 @@
         </p:nvGrpSpPr>
         <p:grpSpPr>
           <a:xfrm>
-            <a:off x="287382" y="749896"/>
+            <a:off x="304800" y="2052760"/>
             <a:ext cx="304800" cy="533400"/>
             <a:chOff x="2339181" y="3718719"/>
             <a:chExt cx="304800" cy="533400"/>
@@ -4148,7 +4164,7 @@
         </p:nvGrpSpPr>
         <p:grpSpPr>
           <a:xfrm>
-            <a:off x="3276600" y="2923977"/>
+            <a:off x="5046618" y="4282492"/>
             <a:ext cx="304800" cy="533400"/>
             <a:chOff x="2339181" y="3718719"/>
             <a:chExt cx="304800" cy="533400"/>
@@ -4243,7 +4259,7 @@
         </p:nvSpPr>
         <p:spPr>
           <a:xfrm>
-            <a:off x="2971800" y="3530600"/>
+            <a:off x="4741818" y="4879181"/>
             <a:ext cx="914400" cy="340519"/>
           </a:xfrm>
           <a:prstGeom prst="roundRect">
@@ -4263,148 +4279,12 @@
           <a:p>
             <a:pPr algn="ctr"/>
             <a:r>
-              <a:rPr lang="en-US" sz="1400" b="1" dirty="0" smtClean="0">
+              <a:rPr lang="en-US" sz="1400" b="1" dirty="0">
                 <a:solidFill>
                   <a:schemeClr val="bg1"/>
                 </a:solidFill>
               </a:rPr>
               <a:t>Reviewer</a:t>
-            </a:r>
-            <a:endParaRPr lang="en-US" sz="1400" b="1" dirty="0">
-              <a:solidFill>
-                <a:schemeClr val="bg1"/>
-              </a:solidFill>
-            </a:endParaRPr>
-          </a:p>
-        </p:txBody>
-      </p:sp>
-      <p:grpSp>
-        <p:nvGrpSpPr>
-          <p:cNvPr id="232" name="Group 231"/>
-          <p:cNvGrpSpPr/>
-          <p:nvPr/>
-        </p:nvGrpSpPr>
-        <p:grpSpPr>
-          <a:xfrm>
-            <a:off x="4935582" y="2923977"/>
-            <a:ext cx="304800" cy="533400"/>
-            <a:chOff x="2339181" y="3718719"/>
-            <a:chExt cx="304800" cy="533400"/>
-          </a:xfrm>
-        </p:grpSpPr>
-        <p:sp>
-          <p:nvSpPr>
-            <p:cNvPr id="233" name="Flowchart: Connector 232"/>
-            <p:cNvSpPr/>
-            <p:nvPr/>
-          </p:nvSpPr>
-          <p:spPr>
-            <a:xfrm>
-              <a:off x="2377281" y="3718719"/>
-              <a:ext cx="228600" cy="228600"/>
-            </a:xfrm>
-            <a:prstGeom prst="flowChartConnector">
-              <a:avLst/>
-            </a:prstGeom>
-          </p:spPr>
-          <p:style>
-            <a:lnRef idx="2">
-              <a:schemeClr val="accent4">
-                <a:shade val="50000"/>
-              </a:schemeClr>
-            </a:lnRef>
-            <a:fillRef idx="1">
-              <a:schemeClr val="accent4"/>
-            </a:fillRef>
-            <a:effectRef idx="0">
-              <a:schemeClr val="accent4"/>
-            </a:effectRef>
-            <a:fontRef idx="minor">
-              <a:schemeClr val="lt1"/>
-            </a:fontRef>
-          </p:style>
-          <p:txBody>
-            <a:bodyPr rtlCol="0" anchor="ctr"/>
-            <a:lstStyle/>
-            <a:p>
-              <a:pPr algn="ctr"/>
-              <a:endParaRPr lang="en-US" b="1"/>
-            </a:p>
-          </p:txBody>
-        </p:sp>
-        <p:sp>
-          <p:nvSpPr>
-            <p:cNvPr id="234" name="Flowchart: Delay 233"/>
-            <p:cNvSpPr/>
-            <p:nvPr/>
-          </p:nvSpPr>
-          <p:spPr>
-            <a:xfrm rot="16200000">
-              <a:off x="2339181" y="3947319"/>
-              <a:ext cx="304800" cy="304800"/>
-            </a:xfrm>
-            <a:prstGeom prst="flowChartDelay">
-              <a:avLst/>
-            </a:prstGeom>
-          </p:spPr>
-          <p:style>
-            <a:lnRef idx="2">
-              <a:schemeClr val="accent4">
-                <a:shade val="50000"/>
-              </a:schemeClr>
-            </a:lnRef>
-            <a:fillRef idx="1">
-              <a:schemeClr val="accent4"/>
-            </a:fillRef>
-            <a:effectRef idx="0">
-              <a:schemeClr val="accent4"/>
-            </a:effectRef>
-            <a:fontRef idx="minor">
-              <a:schemeClr val="lt1"/>
-            </a:fontRef>
-          </p:style>
-          <p:txBody>
-            <a:bodyPr rtlCol="0" anchor="ctr"/>
-            <a:lstStyle/>
-            <a:p>
-              <a:pPr algn="ctr"/>
-              <a:endParaRPr lang="en-US" b="1"/>
-            </a:p>
-          </p:txBody>
-        </p:sp>
-      </p:grpSp>
-      <p:sp>
-        <p:nvSpPr>
-          <p:cNvPr id="235" name="TextBox 234"/>
-          <p:cNvSpPr txBox="1"/>
-          <p:nvPr/>
-        </p:nvSpPr>
-        <p:spPr>
-          <a:xfrm>
-            <a:off x="4630782" y="3530600"/>
-            <a:ext cx="1066800" cy="340519"/>
-          </a:xfrm>
-          <a:prstGeom prst="roundRect">
-            <a:avLst/>
-          </a:prstGeom>
-          <a:solidFill>
-            <a:srgbClr val="7030A0"/>
-          </a:solidFill>
-        </p:spPr>
-        <p:txBody>
-          <a:bodyPr wrap="square" rtlCol="0">
-            <a:spAutoFit/>
-          </a:bodyPr>
-          <a:lstStyle/>
-          <a:p>
-            <a:pPr algn="ctr"/>
-            <a:r>
-              <a:rPr lang="en-US" sz="1400" b="1" dirty="0" smtClean="0">
-                <a:solidFill>
-                  <a:schemeClr val="bg1"/>
-                </a:solidFill>
-              </a:rPr>
-              <a:t>Team Lead</a:t>
             </a:r>
           </a:p>
         </p:txBody>
@@ -4417,7 +4297,7 @@
         </p:nvGrpSpPr>
         <p:grpSpPr>
           <a:xfrm>
-            <a:off x="7450182" y="2923977"/>
+            <a:off x="7578558" y="525783"/>
             <a:ext cx="304800" cy="533400"/>
             <a:chOff x="2339181" y="3718719"/>
             <a:chExt cx="304800" cy="533400"/>
@@ -4512,7 +4392,7 @@
         </p:nvSpPr>
         <p:spPr>
           <a:xfrm>
-            <a:off x="7343838" y="3530600"/>
+            <a:off x="7472214" y="1132407"/>
             <a:ext cx="533400" cy="340519"/>
           </a:xfrm>
           <a:prstGeom prst="roundRect">
@@ -4532,7 +4412,7 @@
           <a:p>
             <a:pPr algn="ctr"/>
             <a:r>
-              <a:rPr lang="en-US" sz="1400" b="1" dirty="0" smtClean="0">
+              <a:rPr lang="en-US" sz="1400" b="1" dirty="0">
                 <a:solidFill>
                   <a:schemeClr val="bg1"/>
                 </a:solidFill>
@@ -4550,7 +4430,7 @@
         </p:nvSpPr>
         <p:spPr>
           <a:xfrm>
-            <a:off x="58782" y="1399977"/>
+            <a:off x="76200" y="2702842"/>
             <a:ext cx="533400" cy="340519"/>
           </a:xfrm>
           <a:prstGeom prst="roundRect">
@@ -4567,7 +4447,7 @@
           <a:lstStyle/>
           <a:p>
             <a:r>
-              <a:rPr lang="en-US" sz="1400" b="1" dirty="0" smtClean="0">
+              <a:rPr lang="en-US" sz="1400" b="1" dirty="0">
                 <a:solidFill>
                   <a:schemeClr val="bg1"/>
                 </a:solidFill>
@@ -4585,7 +4465,7 @@
         </p:nvSpPr>
         <p:spPr>
           <a:xfrm>
-            <a:off x="1506581" y="61119"/>
+            <a:off x="1524000" y="1363984"/>
             <a:ext cx="1533097" cy="307777"/>
           </a:xfrm>
           <a:prstGeom prst="rect">
@@ -4600,18 +4480,13 @@
           <a:lstStyle/>
           <a:p>
             <a:r>
-              <a:rPr lang="en-US" sz="1400" b="1" dirty="0" smtClean="0">
+              <a:rPr lang="en-US" sz="1400" b="1" dirty="0">
                 <a:solidFill>
                   <a:srgbClr val="00B050"/>
                 </a:solidFill>
               </a:rPr>
               <a:t>1. pull</a:t>
             </a:r>
-            <a:endParaRPr lang="en-US" sz="1400" b="1" dirty="0">
-              <a:solidFill>
-                <a:srgbClr val="00B050"/>
-              </a:solidFill>
-            </a:endParaRPr>
           </a:p>
         </p:txBody>
       </p:sp>
@@ -4623,7 +4498,7 @@
         </p:nvSpPr>
         <p:spPr>
           <a:xfrm>
-            <a:off x="1430382" y="746919"/>
+            <a:off x="1447800" y="2049783"/>
             <a:ext cx="381000" cy="304800"/>
           </a:xfrm>
           <a:prstGeom prst="arc">
@@ -4671,7 +4546,7 @@
         </p:nvSpPr>
         <p:spPr>
           <a:xfrm>
-            <a:off x="1887582" y="670719"/>
+            <a:off x="1905000" y="1973584"/>
             <a:ext cx="990600" cy="646331"/>
           </a:xfrm>
           <a:prstGeom prst="rect">
@@ -4686,7 +4561,7 @@
           <a:lstStyle/>
           <a:p>
             <a:r>
-              <a:rPr lang="en-US" sz="1400" b="1" dirty="0" smtClean="0">
+              <a:rPr lang="en-US" sz="1400" b="1" dirty="0">
                 <a:solidFill>
                   <a:srgbClr val="00B050"/>
                 </a:solidFill>
@@ -4694,14 +4569,14 @@
               <a:t>2.1 branch</a:t>
             </a:r>
             <a:br>
-              <a:rPr lang="en-US" sz="1400" b="1" dirty="0" smtClean="0">
+              <a:rPr lang="en-US" sz="1400" b="1" dirty="0">
                 <a:solidFill>
                   <a:srgbClr val="00B050"/>
                 </a:solidFill>
               </a:rPr>
             </a:br>
             <a:r>
-              <a:rPr lang="en-US" sz="1400" b="1" dirty="0" smtClean="0">
+              <a:rPr lang="en-US" sz="1400" b="1" dirty="0">
                 <a:solidFill>
                   <a:srgbClr val="00B050"/>
                 </a:solidFill>
@@ -4711,18 +4586,13 @@
           </a:p>
           <a:p>
             <a:r>
-              <a:rPr lang="en-US" sz="1400" b="1" dirty="0" smtClean="0">
+              <a:rPr lang="en-US" sz="1400" b="1" dirty="0">
                 <a:solidFill>
                   <a:srgbClr val="00B050"/>
                 </a:solidFill>
               </a:rPr>
               <a:t>2.3 test</a:t>
             </a:r>
-            <a:endParaRPr lang="en-US" sz="1400" b="1" dirty="0">
-              <a:solidFill>
-                <a:srgbClr val="00B050"/>
-              </a:solidFill>
-            </a:endParaRPr>
           </a:p>
         </p:txBody>
       </p:sp>
@@ -4734,7 +4604,7 @@
         </p:nvSpPr>
         <p:spPr>
           <a:xfrm rot="814929">
-            <a:off x="1602736" y="2552738"/>
+            <a:off x="1620154" y="3855603"/>
             <a:ext cx="1182604" cy="430887"/>
           </a:xfrm>
           <a:prstGeom prst="rect">
@@ -4749,7 +4619,7 @@
           <a:lstStyle/>
           <a:p>
             <a:r>
-              <a:rPr lang="en-US" sz="1400" b="1" dirty="0" smtClean="0">
+              <a:rPr lang="en-US" sz="1400" b="1" dirty="0">
                 <a:solidFill>
                   <a:srgbClr val="00B050"/>
                 </a:solidFill>
@@ -4757,49 +4627,81 @@
               <a:t>3. create pull </a:t>
             </a:r>
             <a:br>
-              <a:rPr lang="en-US" sz="1400" b="1" dirty="0" smtClean="0">
+              <a:rPr lang="en-US" sz="1400" b="1" dirty="0">
                 <a:solidFill>
                   <a:srgbClr val="00B050"/>
                 </a:solidFill>
               </a:rPr>
             </a:br>
             <a:r>
-              <a:rPr lang="en-US" sz="1400" b="1" dirty="0" smtClean="0">
+              <a:rPr lang="en-US" sz="1400" b="1" dirty="0">
                 <a:solidFill>
                   <a:srgbClr val="00B050"/>
                 </a:solidFill>
               </a:rPr>
               <a:t>request</a:t>
             </a:r>
-            <a:endParaRPr lang="en-US" sz="1400" b="1" dirty="0">
-              <a:solidFill>
-                <a:srgbClr val="00B050"/>
-              </a:solidFill>
-            </a:endParaRPr>
-          </a:p>
-        </p:txBody>
-      </p:sp>
-      <p:cxnSp>
-        <p:nvCxnSpPr>
-          <p:cNvPr id="245" name="Straight Arrow Connector 244"/>
-          <p:cNvCxnSpPr/>
+          </a:p>
+        </p:txBody>
+      </p:sp>
+      <p:sp>
+        <p:nvSpPr>
+          <p:cNvPr id="246" name="TextBox 245"/>
+          <p:cNvSpPr txBox="1"/>
           <p:nvPr/>
-        </p:nvCxnSpPr>
+        </p:nvSpPr>
         <p:spPr>
-          <a:xfrm flipV="1">
-            <a:off x="3429000" y="2118519"/>
-            <a:ext cx="228600" cy="685800"/>
-          </a:xfrm>
-          <a:prstGeom prst="straightConnector1">
+          <a:xfrm rot="4019994">
+            <a:off x="3408391" y="3797364"/>
+            <a:ext cx="843775" cy="215444"/>
+          </a:xfrm>
+          <a:prstGeom prst="rect">
             <a:avLst/>
+          </a:prstGeom>
+          <a:noFill/>
+        </p:spPr>
+        <p:txBody>
+          <a:bodyPr wrap="square" lIns="0" tIns="0" rIns="0" bIns="0" rtlCol="0">
+            <a:spAutoFit/>
+          </a:bodyPr>
+          <a:lstStyle/>
+          <a:p>
+            <a:r>
+              <a:rPr lang="en-US" sz="1400" b="1" dirty="0">
+                <a:solidFill>
+                  <a:schemeClr val="accent6">
+                    <a:lumMod val="75000"/>
+                  </a:schemeClr>
+                </a:solidFill>
+              </a:rPr>
+              <a:t>4. review</a:t>
+            </a:r>
+          </a:p>
+        </p:txBody>
+      </p:sp>
+      <p:sp>
+        <p:nvSpPr>
+          <p:cNvPr id="247" name="Arc 246"/>
+          <p:cNvSpPr/>
+          <p:nvPr/>
+        </p:nvSpPr>
+        <p:spPr>
+          <a:xfrm>
+            <a:off x="1524000" y="1595560"/>
+            <a:ext cx="4419600" cy="1219200"/>
+          </a:xfrm>
+          <a:prstGeom prst="arc">
+            <a:avLst>
+              <a:gd name="adj1" fmla="val 10806261"/>
+              <a:gd name="adj2" fmla="val 21472686"/>
+            </a:avLst>
           </a:prstGeom>
           <a:ln w="28575">
             <a:solidFill>
-              <a:schemeClr val="accent6">
-                <a:lumMod val="75000"/>
-              </a:schemeClr>
+              <a:srgbClr val="00B050"/>
             </a:solidFill>
-            <a:tailEnd type="triangle"/>
+            <a:headEnd type="triangle"/>
+            <a:tailEnd type="none"/>
           </a:ln>
         </p:spPr>
         <p:style>
@@ -4816,72 +4718,38 @@
             <a:schemeClr val="tx1"/>
           </a:fontRef>
         </p:style>
-      </p:cxnSp>
-      <p:sp>
-        <p:nvSpPr>
-          <p:cNvPr id="246" name="TextBox 245"/>
-          <p:cNvSpPr txBox="1"/>
-          <p:nvPr/>
-        </p:nvSpPr>
-        <p:spPr>
-          <a:xfrm rot="17318509">
-            <a:off x="2948337" y="2334600"/>
-            <a:ext cx="843775" cy="215444"/>
-          </a:xfrm>
-          <a:prstGeom prst="rect">
-            <a:avLst/>
-          </a:prstGeom>
-          <a:noFill/>
-        </p:spPr>
-        <p:txBody>
-          <a:bodyPr wrap="square" lIns="0" tIns="0" rIns="0" bIns="0" rtlCol="0">
-            <a:spAutoFit/>
-          </a:bodyPr>
-          <a:lstStyle/>
-          <a:p>
-            <a:r>
-              <a:rPr lang="en-US" sz="1400" b="1" dirty="0" smtClean="0">
-                <a:solidFill>
-                  <a:schemeClr val="accent6">
-                    <a:lumMod val="75000"/>
-                  </a:schemeClr>
-                </a:solidFill>
-              </a:rPr>
-              <a:t>4. review</a:t>
-            </a:r>
-            <a:endParaRPr lang="en-US" sz="1400" b="1" dirty="0">
-              <a:solidFill>
-                <a:schemeClr val="accent6">
-                  <a:lumMod val="75000"/>
-                </a:schemeClr>
-              </a:solidFill>
-            </a:endParaRPr>
-          </a:p>
-        </p:txBody>
-      </p:sp>
-      <p:sp>
-        <p:nvSpPr>
-          <p:cNvPr id="247" name="Arc 246"/>
+        <p:txBody>
+          <a:bodyPr rtlCol="0" anchor="ctr"/>
+          <a:lstStyle/>
+          <a:p>
+            <a:pPr algn="ctr"/>
+            <a:endParaRPr lang="en-US" b="1"/>
+          </a:p>
+        </p:txBody>
+      </p:sp>
+      <p:sp>
+        <p:nvSpPr>
+          <p:cNvPr id="248" name="Arc 247"/>
           <p:cNvSpPr/>
           <p:nvPr/>
         </p:nvSpPr>
         <p:spPr>
-          <a:xfrm>
-            <a:off x="1506582" y="292696"/>
-            <a:ext cx="4419600" cy="1219200"/>
+          <a:xfrm flipV="1">
+            <a:off x="1455016" y="2619915"/>
+            <a:ext cx="1902663" cy="1157557"/>
           </a:xfrm>
           <a:prstGeom prst="arc">
             <a:avLst>
-              <a:gd name="adj1" fmla="val 10806261"/>
-              <a:gd name="adj2" fmla="val 21472686"/>
+              <a:gd name="adj1" fmla="val 10893249"/>
+              <a:gd name="adj2" fmla="val 21547413"/>
             </a:avLst>
           </a:prstGeom>
           <a:ln w="28575">
             <a:solidFill>
               <a:srgbClr val="00B050"/>
             </a:solidFill>
-            <a:headEnd type="triangle"/>
-            <a:tailEnd type="none"/>
+            <a:headEnd type="none"/>
+            <a:tailEnd type="triangle"/>
           </a:ln>
         </p:spPr>
         <p:style>
@@ -4909,24 +4777,26 @@
       </p:sp>
       <p:sp>
         <p:nvSpPr>
-          <p:cNvPr id="248" name="Arc 247"/>
+          <p:cNvPr id="249" name="Arc 248"/>
           <p:cNvSpPr/>
           <p:nvPr/>
         </p:nvSpPr>
         <p:spPr>
-          <a:xfrm flipV="1">
-            <a:off x="1437597" y="1317050"/>
-            <a:ext cx="1902663" cy="1157557"/>
+          <a:xfrm rot="3662859" flipV="1">
+            <a:off x="3957686" y="3484137"/>
+            <a:ext cx="1356586" cy="272423"/>
           </a:xfrm>
           <a:prstGeom prst="arc">
             <a:avLst>
-              <a:gd name="adj1" fmla="val 10893249"/>
-              <a:gd name="adj2" fmla="val 21547413"/>
+              <a:gd name="adj1" fmla="val 11081571"/>
+              <a:gd name="adj2" fmla="val 21323423"/>
             </a:avLst>
           </a:prstGeom>
           <a:ln w="28575">
             <a:solidFill>
-              <a:srgbClr val="00B050"/>
+              <a:schemeClr val="accent6">
+                <a:lumMod val="75000"/>
+              </a:schemeClr>
             </a:solidFill>
             <a:headEnd type="none"/>
             <a:tailEnd type="triangle"/>
@@ -4957,24 +4827,81 @@
       </p:sp>
       <p:sp>
         <p:nvSpPr>
-          <p:cNvPr id="249" name="Arc 248"/>
+          <p:cNvPr id="250" name="TextBox 249"/>
+          <p:cNvSpPr txBox="1"/>
+          <p:nvPr/>
+        </p:nvSpPr>
+        <p:spPr>
+          <a:xfrm rot="3374372">
+            <a:off x="3801112" y="3812601"/>
+            <a:ext cx="1417411" cy="215444"/>
+          </a:xfrm>
+          <a:prstGeom prst="rect">
+            <a:avLst/>
+          </a:prstGeom>
+          <a:noFill/>
+        </p:spPr>
+        <p:txBody>
+          <a:bodyPr wrap="square" lIns="0" tIns="0" rIns="0" bIns="0" rtlCol="0">
+            <a:spAutoFit/>
+          </a:bodyPr>
+          <a:lstStyle/>
+          <a:p>
+            <a:r>
+              <a:rPr lang="en-US" sz="1400" b="1" dirty="0">
+                <a:solidFill>
+                  <a:schemeClr val="accent6">
+                    <a:lumMod val="75000"/>
+                  </a:schemeClr>
+                </a:solidFill>
+              </a:rPr>
+              <a:t>6</a:t>
+            </a:r>
+            <a:r>
+              <a:rPr lang="en-US" sz="1400" b="1" dirty="0" smtClean="0">
+                <a:solidFill>
+                  <a:schemeClr val="accent6">
+                    <a:lumMod val="75000"/>
+                  </a:schemeClr>
+                </a:solidFill>
+              </a:rPr>
+              <a:t>. pull </a:t>
+            </a:r>
+            <a:r>
+              <a:rPr lang="en-US" sz="1400" b="1" dirty="0">
+                <a:solidFill>
+                  <a:schemeClr val="accent6">
+                    <a:lumMod val="75000"/>
+                  </a:schemeClr>
+                </a:solidFill>
+              </a:rPr>
+              <a:t>branch</a:t>
+            </a:r>
+          </a:p>
+        </p:txBody>
+      </p:sp>
+      <p:sp>
+        <p:nvSpPr>
+          <p:cNvPr id="251" name="Arc 250"/>
           <p:cNvSpPr/>
           <p:nvPr/>
         </p:nvSpPr>
         <p:spPr>
-          <a:xfrm rot="2715976" flipV="1">
-            <a:off x="3765747" y="2094271"/>
-            <a:ext cx="1356586" cy="381000"/>
+          <a:xfrm rot="16709798">
+            <a:off x="5003188" y="3995129"/>
+            <a:ext cx="381000" cy="304800"/>
           </a:xfrm>
           <a:prstGeom prst="arc">
             <a:avLst>
-              <a:gd name="adj1" fmla="val 11540120"/>
-              <a:gd name="adj2" fmla="val 21323423"/>
+              <a:gd name="adj1" fmla="val 16200000"/>
+              <a:gd name="adj2" fmla="val 5027432"/>
             </a:avLst>
           </a:prstGeom>
           <a:ln w="28575">
             <a:solidFill>
-              <a:srgbClr val="7030A0"/>
+              <a:schemeClr val="accent6">
+                <a:lumMod val="75000"/>
+              </a:schemeClr>
             </a:solidFill>
             <a:headEnd type="none"/>
             <a:tailEnd type="triangle"/>
@@ -4999,20 +4926,24 @@
           <a:lstStyle/>
           <a:p>
             <a:pPr algn="ctr"/>
-            <a:endParaRPr lang="en-US" b="1"/>
-          </a:p>
-        </p:txBody>
-      </p:sp>
-      <p:sp>
-        <p:nvSpPr>
-          <p:cNvPr id="250" name="TextBox 249"/>
+            <a:endParaRPr lang="en-US" b="1">
+              <a:solidFill>
+                <a:srgbClr val="7030A0"/>
+              </a:solidFill>
+            </a:endParaRPr>
+          </a:p>
+        </p:txBody>
+      </p:sp>
+      <p:sp>
+        <p:nvSpPr>
+          <p:cNvPr id="252" name="TextBox 251"/>
           <p:cNvSpPr txBox="1"/>
           <p:nvPr/>
         </p:nvSpPr>
         <p:spPr>
-          <a:xfrm rot="2360287">
-            <a:off x="3627184" y="2543357"/>
-            <a:ext cx="1417411" cy="215444"/>
+          <a:xfrm>
+            <a:off x="4965010" y="3669439"/>
+            <a:ext cx="739662" cy="215444"/>
           </a:xfrm>
           <a:prstGeom prst="rect">
             <a:avLst/>
@@ -5028,47 +4959,48 @@
             <a:r>
               <a:rPr lang="en-US" sz="1400" b="1" dirty="0" smtClean="0">
                 <a:solidFill>
-                  <a:srgbClr val="7030A0"/>
+                  <a:schemeClr val="accent6">
+                    <a:lumMod val="75000"/>
+                  </a:schemeClr>
                 </a:solidFill>
               </a:rPr>
-              <a:t>5. </a:t>
-            </a:r>
-            <a:r>
-              <a:rPr lang="en-US" sz="1400" b="1" dirty="0" smtClean="0">
+              <a:t>7. </a:t>
+            </a:r>
+            <a:r>
+              <a:rPr lang="en-US" sz="1400" b="1" dirty="0">
                 <a:solidFill>
-                  <a:srgbClr val="7030A0"/>
+                  <a:schemeClr val="accent6">
+                    <a:lumMod val="75000"/>
+                  </a:schemeClr>
                 </a:solidFill>
               </a:rPr>
-              <a:t>Pull branch</a:t>
-            </a:r>
-            <a:endParaRPr lang="en-US" sz="1400" b="1" dirty="0">
-              <a:solidFill>
-                <a:srgbClr val="7030A0"/>
-              </a:solidFill>
-            </a:endParaRPr>
-          </a:p>
-        </p:txBody>
-      </p:sp>
-      <p:sp>
-        <p:nvSpPr>
-          <p:cNvPr id="251" name="Arc 250"/>
+              <a:t>merge</a:t>
+            </a:r>
+          </a:p>
+        </p:txBody>
+      </p:sp>
+      <p:sp>
+        <p:nvSpPr>
+          <p:cNvPr id="253" name="Arc 252"/>
           <p:cNvSpPr/>
           <p:nvPr/>
         </p:nvSpPr>
         <p:spPr>
-          <a:xfrm rot="16709798">
-            <a:off x="4923957" y="2677703"/>
-            <a:ext cx="381000" cy="304800"/>
+          <a:xfrm rot="19019392" flipV="1">
+            <a:off x="5083089" y="3485285"/>
+            <a:ext cx="1458516" cy="504373"/>
           </a:xfrm>
           <a:prstGeom prst="arc">
             <a:avLst>
-              <a:gd name="adj1" fmla="val 16200000"/>
-              <a:gd name="adj2" fmla="val 5027432"/>
+              <a:gd name="adj1" fmla="val 11540120"/>
+              <a:gd name="adj2" fmla="val 21323423"/>
             </a:avLst>
           </a:prstGeom>
           <a:ln w="28575">
             <a:solidFill>
-              <a:srgbClr val="7030A0"/>
+              <a:schemeClr val="accent6">
+                <a:lumMod val="75000"/>
+              </a:schemeClr>
             </a:solidFill>
             <a:headEnd type="none"/>
             <a:tailEnd type="triangle"/>
@@ -5093,24 +5025,20 @@
           <a:lstStyle/>
           <a:p>
             <a:pPr algn="ctr"/>
-            <a:endParaRPr lang="en-US" b="1">
-              <a:solidFill>
-                <a:srgbClr val="7030A0"/>
-              </a:solidFill>
-            </a:endParaRPr>
-          </a:p>
-        </p:txBody>
-      </p:sp>
-      <p:sp>
-        <p:nvSpPr>
-          <p:cNvPr id="252" name="TextBox 251"/>
+            <a:endParaRPr lang="en-US" b="1"/>
+          </a:p>
+        </p:txBody>
+      </p:sp>
+      <p:sp>
+        <p:nvSpPr>
+          <p:cNvPr id="254" name="TextBox 253"/>
           <p:cNvSpPr txBox="1"/>
           <p:nvPr/>
         </p:nvSpPr>
         <p:spPr>
-          <a:xfrm>
-            <a:off x="4859382" y="2161977"/>
-            <a:ext cx="838200" cy="430887"/>
+          <a:xfrm rot="18996887">
+            <a:off x="5750480" y="3881920"/>
+            <a:ext cx="685800" cy="215444"/>
           </a:xfrm>
           <a:prstGeom prst="rect">
             <a:avLst/>
@@ -5124,54 +5052,48 @@
           <a:lstStyle/>
           <a:p>
             <a:r>
+              <a:rPr lang="en-US" sz="1400" b="1" dirty="0">
+                <a:solidFill>
+                  <a:schemeClr val="accent6">
+                    <a:lumMod val="75000"/>
+                  </a:schemeClr>
+                </a:solidFill>
+              </a:rPr>
+              <a:t>8</a:t>
+            </a:r>
+            <a:r>
               <a:rPr lang="en-US" sz="1400" b="1" dirty="0" smtClean="0">
                 <a:solidFill>
-                  <a:srgbClr val="7030A0"/>
+                  <a:schemeClr val="accent6">
+                    <a:lumMod val="75000"/>
+                  </a:schemeClr>
                 </a:solidFill>
               </a:rPr>
-              <a:t>6.1 test</a:t>
-            </a:r>
-            <a:br>
-              <a:rPr lang="en-US" sz="1400" b="1" dirty="0" smtClean="0">
+              <a:t>. </a:t>
+            </a:r>
+            <a:r>
+              <a:rPr lang="en-US" sz="1400" b="1" dirty="0">
                 <a:solidFill>
-                  <a:srgbClr val="7030A0"/>
+                  <a:schemeClr val="accent6">
+                    <a:lumMod val="75000"/>
+                  </a:schemeClr>
                 </a:solidFill>
               </a:rPr>
-            </a:br>
-            <a:r>
-              <a:rPr lang="en-US" sz="1400" b="1" dirty="0" smtClean="0">
-                <a:solidFill>
-                  <a:srgbClr val="7030A0"/>
-                </a:solidFill>
-              </a:rPr>
-              <a:t>6.2 </a:t>
-            </a:r>
-            <a:r>
-              <a:rPr lang="en-US" sz="1400" b="1" dirty="0" smtClean="0">
-                <a:solidFill>
-                  <a:srgbClr val="7030A0"/>
-                </a:solidFill>
-              </a:rPr>
-              <a:t>merge</a:t>
-            </a:r>
-            <a:endParaRPr lang="en-US" sz="1400" b="1" dirty="0">
-              <a:solidFill>
-                <a:srgbClr val="7030A0"/>
-              </a:solidFill>
-            </a:endParaRPr>
-          </a:p>
-        </p:txBody>
-      </p:sp>
-      <p:sp>
-        <p:nvSpPr>
-          <p:cNvPr id="253" name="Arc 252"/>
+              <a:t>push</a:t>
+            </a:r>
+          </a:p>
+        </p:txBody>
+      </p:sp>
+      <p:sp>
+        <p:nvSpPr>
+          <p:cNvPr id="255" name="Arc 254"/>
           <p:cNvSpPr/>
           <p:nvPr/>
         </p:nvSpPr>
         <p:spPr>
-          <a:xfrm rot="19019392" flipV="1">
-            <a:off x="5111825" y="2164236"/>
-            <a:ext cx="1356586" cy="381000"/>
+          <a:xfrm rot="18884024">
+            <a:off x="6213856" y="1514375"/>
+            <a:ext cx="1440312" cy="381000"/>
           </a:xfrm>
           <a:prstGeom prst="arc">
             <a:avLst>
@@ -5181,7 +5103,7 @@
           </a:prstGeom>
           <a:ln w="28575">
             <a:solidFill>
-              <a:srgbClr val="7030A0"/>
+              <a:srgbClr val="0070C0"/>
             </a:solidFill>
             <a:headEnd type="none"/>
             <a:tailEnd type="triangle"/>
@@ -5212,13 +5134,13 @@
       </p:sp>
       <p:sp>
         <p:nvSpPr>
-          <p:cNvPr id="254" name="TextBox 253"/>
+          <p:cNvPr id="256" name="TextBox 255"/>
           <p:cNvSpPr txBox="1"/>
           <p:nvPr/>
         </p:nvSpPr>
         <p:spPr>
-          <a:xfrm rot="18996887">
-            <a:off x="5677880" y="2477023"/>
+          <a:xfrm rot="19098151" flipH="1">
+            <a:off x="6424764" y="1334046"/>
             <a:ext cx="685800" cy="215444"/>
           </a:xfrm>
           <a:prstGeom prst="rect">
@@ -5233,36 +5155,47 @@
           <a:lstStyle/>
           <a:p>
             <a:r>
+              <a:rPr lang="en-US" sz="1400" b="1" dirty="0">
+                <a:solidFill>
+                  <a:srgbClr val="0070C0"/>
+                </a:solidFill>
+              </a:rPr>
+              <a:t>9</a:t>
+            </a:r>
+            <a:r>
               <a:rPr lang="en-US" sz="1400" b="1" dirty="0" smtClean="0">
                 <a:solidFill>
-                  <a:srgbClr val="7030A0"/>
+                  <a:srgbClr val="0070C0"/>
                 </a:solidFill>
               </a:rPr>
-              <a:t>7. push</a:t>
-            </a:r>
-            <a:endParaRPr lang="en-US" sz="1400" b="1" dirty="0">
-              <a:solidFill>
-                <a:srgbClr val="7030A0"/>
-              </a:solidFill>
-            </a:endParaRPr>
-          </a:p>
-        </p:txBody>
-      </p:sp>
-      <p:sp>
-        <p:nvSpPr>
-          <p:cNvPr id="255" name="Arc 254"/>
+              <a:t>. </a:t>
+            </a:r>
+            <a:r>
+              <a:rPr lang="en-US" sz="1400" b="1" dirty="0">
+                <a:solidFill>
+                  <a:srgbClr val="0070C0"/>
+                </a:solidFill>
+              </a:rPr>
+              <a:t>pull</a:t>
+            </a:r>
+          </a:p>
+        </p:txBody>
+      </p:sp>
+      <p:sp>
+        <p:nvSpPr>
+          <p:cNvPr id="257" name="Arc 256"/>
           <p:cNvSpPr/>
           <p:nvPr/>
         </p:nvSpPr>
         <p:spPr>
-          <a:xfrm rot="2715976" flipV="1">
-            <a:off x="6283380" y="2035793"/>
-            <a:ext cx="1356586" cy="381000"/>
+          <a:xfrm rot="15843024" flipH="1">
+            <a:off x="7572636" y="1405522"/>
+            <a:ext cx="381000" cy="304800"/>
           </a:xfrm>
           <a:prstGeom prst="arc">
             <a:avLst>
-              <a:gd name="adj1" fmla="val 11540120"/>
-              <a:gd name="adj2" fmla="val 21323423"/>
+              <a:gd name="adj1" fmla="val 16200000"/>
+              <a:gd name="adj2" fmla="val 5027432"/>
             </a:avLst>
           </a:prstGeom>
           <a:ln w="28575">
@@ -5298,14 +5231,14 @@
       </p:sp>
       <p:sp>
         <p:nvSpPr>
-          <p:cNvPr id="256" name="TextBox 255"/>
+          <p:cNvPr id="258" name="TextBox 257"/>
           <p:cNvSpPr txBox="1"/>
           <p:nvPr/>
         </p:nvSpPr>
         <p:spPr>
-          <a:xfrm rot="1991192">
-            <a:off x="6550165" y="2494953"/>
-            <a:ext cx="685800" cy="215444"/>
+          <a:xfrm>
+            <a:off x="7332618" y="1771658"/>
+            <a:ext cx="958333" cy="215444"/>
           </a:xfrm>
           <a:prstGeom prst="rect">
             <a:avLst/>
@@ -5324,31 +5257,34 @@
                   <a:srgbClr val="0070C0"/>
                 </a:solidFill>
               </a:rPr>
-              <a:t>8. pull</a:t>
-            </a:r>
-            <a:endParaRPr lang="en-US" sz="1400" b="1" dirty="0">
-              <a:solidFill>
-                <a:srgbClr val="0070C0"/>
-              </a:solidFill>
-            </a:endParaRPr>
-          </a:p>
-        </p:txBody>
-      </p:sp>
-      <p:sp>
-        <p:nvSpPr>
-          <p:cNvPr id="257" name="Arc 256"/>
+              <a:t>10. </a:t>
+            </a:r>
+            <a:r>
+              <a:rPr lang="en-US" sz="1400" b="1" dirty="0">
+                <a:solidFill>
+                  <a:srgbClr val="0070C0"/>
+                </a:solidFill>
+              </a:rPr>
+              <a:t>live test</a:t>
+            </a:r>
+          </a:p>
+        </p:txBody>
+      </p:sp>
+      <p:sp>
+        <p:nvSpPr>
+          <p:cNvPr id="259" name="Arc 258"/>
           <p:cNvSpPr/>
           <p:nvPr/>
         </p:nvSpPr>
         <p:spPr>
-          <a:xfrm rot="16709798">
-            <a:off x="7441590" y="2619225"/>
-            <a:ext cx="381000" cy="304800"/>
+          <a:xfrm rot="2580608">
+            <a:off x="7718485" y="1470666"/>
+            <a:ext cx="1356586" cy="381000"/>
           </a:xfrm>
           <a:prstGeom prst="arc">
             <a:avLst>
-              <a:gd name="adj1" fmla="val 16200000"/>
-              <a:gd name="adj2" fmla="val 5027432"/>
+              <a:gd name="adj1" fmla="val 11540120"/>
+              <a:gd name="adj2" fmla="val 21323423"/>
             </a:avLst>
           </a:prstGeom>
           <a:ln w="28575">
@@ -5384,14 +5320,14 @@
       </p:sp>
       <p:sp>
         <p:nvSpPr>
-          <p:cNvPr id="258" name="TextBox 257"/>
+          <p:cNvPr id="260" name="TextBox 259"/>
           <p:cNvSpPr txBox="1"/>
           <p:nvPr/>
         </p:nvSpPr>
         <p:spPr>
-          <a:xfrm>
-            <a:off x="7377015" y="2314377"/>
-            <a:ext cx="835167" cy="215444"/>
+          <a:xfrm rot="2697550">
+            <a:off x="8250680" y="1299385"/>
+            <a:ext cx="841701" cy="215444"/>
           </a:xfrm>
           <a:prstGeom prst="rect">
             <a:avLst/>
@@ -5410,99 +5346,16 @@
                   <a:srgbClr val="0070C0"/>
                 </a:solidFill>
               </a:rPr>
-              <a:t>9. live test</a:t>
-            </a:r>
-            <a:endParaRPr lang="en-US" sz="1400" b="1" dirty="0">
-              <a:solidFill>
-                <a:srgbClr val="0070C0"/>
-              </a:solidFill>
-            </a:endParaRPr>
-          </a:p>
-        </p:txBody>
-      </p:sp>
-      <p:sp>
-        <p:nvSpPr>
-          <p:cNvPr id="259" name="Arc 258"/>
-          <p:cNvSpPr/>
-          <p:nvPr/>
-        </p:nvSpPr>
-        <p:spPr>
-          <a:xfrm rot="19019392" flipV="1">
-            <a:off x="7629458" y="2105758"/>
-            <a:ext cx="1356586" cy="381000"/>
-          </a:xfrm>
-          <a:prstGeom prst="arc">
-            <a:avLst>
-              <a:gd name="adj1" fmla="val 11540120"/>
-              <a:gd name="adj2" fmla="val 21323423"/>
-            </a:avLst>
-          </a:prstGeom>
-          <a:ln w="28575">
-            <a:solidFill>
-              <a:srgbClr val="0070C0"/>
-            </a:solidFill>
-            <a:headEnd type="none"/>
-            <a:tailEnd type="triangle"/>
-          </a:ln>
-        </p:spPr>
-        <p:style>
-          <a:lnRef idx="1">
-            <a:schemeClr val="accent1"/>
-          </a:lnRef>
-          <a:fillRef idx="0">
-            <a:schemeClr val="accent1"/>
-          </a:fillRef>
-          <a:effectRef idx="0">
-            <a:schemeClr val="accent1"/>
-          </a:effectRef>
-          <a:fontRef idx="minor">
-            <a:schemeClr val="tx1"/>
-          </a:fontRef>
-        </p:style>
-        <p:txBody>
-          <a:bodyPr rtlCol="0" anchor="ctr"/>
-          <a:lstStyle/>
-          <a:p>
-            <a:pPr algn="ctr"/>
-            <a:endParaRPr lang="en-US" b="1"/>
-          </a:p>
-        </p:txBody>
-      </p:sp>
-      <p:sp>
-        <p:nvSpPr>
-          <p:cNvPr id="260" name="TextBox 259"/>
-          <p:cNvSpPr txBox="1"/>
-          <p:nvPr/>
-        </p:nvSpPr>
-        <p:spPr>
-          <a:xfrm rot="18996887">
-            <a:off x="8273726" y="2378167"/>
-            <a:ext cx="841701" cy="215444"/>
-          </a:xfrm>
-          <a:prstGeom prst="rect">
-            <a:avLst/>
-          </a:prstGeom>
-          <a:noFill/>
-        </p:spPr>
-        <p:txBody>
-          <a:bodyPr wrap="square" lIns="0" tIns="0" rIns="0" bIns="0" rtlCol="0">
-            <a:spAutoFit/>
-          </a:bodyPr>
-          <a:lstStyle/>
-          <a:p>
-            <a:r>
-              <a:rPr lang="en-US" sz="1400" b="1" dirty="0" smtClean="0">
+              <a:t>11. </a:t>
+            </a:r>
+            <a:r>
+              <a:rPr lang="en-US" sz="1400" b="1" dirty="0">
                 <a:solidFill>
                   <a:srgbClr val="0070C0"/>
                 </a:solidFill>
               </a:rPr>
-              <a:t>10. deploy</a:t>
-            </a:r>
-            <a:endParaRPr lang="en-US" sz="1400" b="1" dirty="0">
-              <a:solidFill>
-                <a:srgbClr val="0070C0"/>
-              </a:solidFill>
-            </a:endParaRPr>
+              <a:t>deploy</a:t>
+            </a:r>
           </a:p>
         </p:txBody>
       </p:sp>
@@ -5514,7 +5367,7 @@
         </p:nvSpPr>
         <p:spPr>
           <a:xfrm>
-            <a:off x="1694784" y="515025"/>
+            <a:off x="1712203" y="1817889"/>
             <a:ext cx="3976413" cy="1028484"/>
           </a:xfrm>
           <a:custGeom>
@@ -5760,7 +5613,7 @@
         </p:nvSpPr>
         <p:spPr>
           <a:xfrm>
-            <a:off x="1895903" y="1598275"/>
+            <a:off x="1913322" y="2901139"/>
             <a:ext cx="1152097" cy="215444"/>
           </a:xfrm>
           <a:prstGeom prst="rect">
@@ -5775,26 +5628,13 @@
           <a:lstStyle/>
           <a:p>
             <a:r>
-              <a:rPr lang="en-US" sz="1400" b="1" dirty="0" smtClean="0">
+              <a:rPr lang="en-US" sz="1400" b="1" dirty="0">
                 <a:solidFill>
                   <a:srgbClr val="00CC99"/>
                 </a:solidFill>
               </a:rPr>
-              <a:t>2.4 </a:t>
-            </a:r>
-            <a:r>
-              <a:rPr lang="en-US" sz="1400" b="1" dirty="0" smtClean="0">
-                <a:solidFill>
-                  <a:srgbClr val="00CC99"/>
-                </a:solidFill>
-              </a:rPr>
-              <a:t>pull, merge</a:t>
-            </a:r>
-            <a:endParaRPr lang="en-US" sz="1400" b="1" dirty="0">
-              <a:solidFill>
-                <a:srgbClr val="00CC99"/>
-              </a:solidFill>
-            </a:endParaRPr>
+              <a:t>2.4 pull, merge</a:t>
+            </a:r>
           </a:p>
         </p:txBody>
       </p:sp>
@@ -5806,7 +5646,7 @@
         </p:nvSpPr>
         <p:spPr>
           <a:xfrm>
-            <a:off x="788125" y="749896"/>
+            <a:off x="805543" y="2052761"/>
             <a:ext cx="685800" cy="650081"/>
           </a:xfrm>
           <a:prstGeom prst="can">
@@ -5867,7 +5707,7 @@
         </p:nvSpPr>
         <p:spPr>
           <a:xfrm>
-            <a:off x="3845067" y="932275"/>
+            <a:off x="3862486" y="2235139"/>
             <a:ext cx="1107933" cy="762000"/>
           </a:xfrm>
           <a:prstGeom prst="can">
@@ -5907,23 +5747,18 @@
           <a:p>
             <a:pPr algn="ctr"/>
             <a:r>
-              <a:rPr lang="en-US" sz="1600" b="1" dirty="0" smtClean="0">
+              <a:rPr lang="en-US" sz="1600" b="1" dirty="0">
                 <a:solidFill>
                   <a:schemeClr val="bg1"/>
                 </a:solidFill>
               </a:rPr>
               <a:t>Contributor</a:t>
             </a:r>
-            <a:endParaRPr lang="en-US" sz="1600" b="1" dirty="0" smtClean="0">
-              <a:solidFill>
-                <a:schemeClr val="bg1"/>
-              </a:solidFill>
-            </a:endParaRPr>
           </a:p>
           <a:p>
             <a:pPr algn="ctr"/>
             <a:r>
-              <a:rPr lang="en-US" sz="1600" dirty="0" smtClean="0">
+              <a:rPr lang="en-US" sz="1600" dirty="0">
                 <a:solidFill>
                   <a:schemeClr val="bg1"/>
                 </a:solidFill>
@@ -5941,7 +5776,7 @@
         </p:nvCxnSpPr>
         <p:spPr>
           <a:xfrm flipH="1">
-            <a:off x="4973682" y="1283296"/>
+            <a:off x="4991100" y="2586160"/>
             <a:ext cx="665118" cy="0"/>
           </a:xfrm>
           <a:prstGeom prst="straightConnector1">
@@ -5978,7 +5813,7 @@
         </p:nvSpPr>
         <p:spPr>
           <a:xfrm>
-            <a:off x="4973683" y="973144"/>
+            <a:off x="4991101" y="2276009"/>
             <a:ext cx="766548" cy="307777"/>
           </a:xfrm>
           <a:prstGeom prst="rect">
@@ -5993,18 +5828,13 @@
           <a:lstStyle/>
           <a:p>
             <a:r>
-              <a:rPr lang="en-US" sz="1400" b="1" dirty="0" smtClean="0">
+              <a:rPr lang="en-US" sz="1400" b="1" dirty="0">
                 <a:solidFill>
                   <a:srgbClr val="00B050"/>
                 </a:solidFill>
               </a:rPr>
               <a:t>0. fork</a:t>
             </a:r>
-            <a:endParaRPr lang="en-US" sz="1400" b="1" dirty="0">
-              <a:solidFill>
-                <a:srgbClr val="00B050"/>
-              </a:solidFill>
-            </a:endParaRPr>
           </a:p>
         </p:txBody>
       </p:sp>
@@ -6016,7 +5846,7 @@
         </p:nvSpPr>
         <p:spPr>
           <a:xfrm flipV="1">
-            <a:off x="1506582" y="1135969"/>
+            <a:off x="1524001" y="2438833"/>
             <a:ext cx="1846217" cy="872166"/>
           </a:xfrm>
           <a:prstGeom prst="arc">
@@ -6064,7 +5894,7 @@
         </p:nvSpPr>
         <p:spPr>
           <a:xfrm>
-            <a:off x="1887581" y="2055475"/>
+            <a:off x="1905000" y="3358339"/>
             <a:ext cx="1152097" cy="215444"/>
           </a:xfrm>
           <a:prstGeom prst="rect">
@@ -6079,16 +5909,171 @@
           <a:lstStyle/>
           <a:p>
             <a:r>
-              <a:rPr lang="en-US" sz="1400" b="1" dirty="0" smtClean="0">
+              <a:rPr lang="en-US" sz="1400" b="1" dirty="0">
                 <a:solidFill>
                   <a:srgbClr val="00B050"/>
                 </a:solidFill>
               </a:rPr>
               <a:t>2.5 push</a:t>
             </a:r>
+          </a:p>
+        </p:txBody>
+      </p:sp>
+      <p:sp>
+        <p:nvSpPr>
+          <p:cNvPr id="54" name="Arc 53"/>
+          <p:cNvSpPr/>
+          <p:nvPr/>
+        </p:nvSpPr>
+        <p:spPr>
+          <a:xfrm rot="14651252">
+            <a:off x="3427127" y="3779022"/>
+            <a:ext cx="1763128" cy="431640"/>
+          </a:xfrm>
+          <a:prstGeom prst="arc">
+            <a:avLst>
+              <a:gd name="adj1" fmla="val 11081571"/>
+              <a:gd name="adj2" fmla="val 21481034"/>
+            </a:avLst>
+          </a:prstGeom>
+          <a:ln w="28575">
+            <a:solidFill>
+              <a:schemeClr val="accent6">
+                <a:lumMod val="75000"/>
+              </a:schemeClr>
+            </a:solidFill>
+            <a:headEnd type="none"/>
+            <a:tailEnd type="triangle"/>
+          </a:ln>
+        </p:spPr>
+        <p:style>
+          <a:lnRef idx="1">
+            <a:schemeClr val="accent1"/>
+          </a:lnRef>
+          <a:fillRef idx="0">
+            <a:schemeClr val="accent1"/>
+          </a:fillRef>
+          <a:effectRef idx="0">
+            <a:schemeClr val="accent1"/>
+          </a:effectRef>
+          <a:fontRef idx="minor">
+            <a:schemeClr val="tx1"/>
+          </a:fontRef>
+        </p:style>
+        <p:txBody>
+          <a:bodyPr rtlCol="0" anchor="ctr"/>
+          <a:lstStyle/>
+          <a:p>
+            <a:pPr algn="ctr"/>
+            <a:endParaRPr lang="en-US" b="1"/>
+          </a:p>
+        </p:txBody>
+      </p:sp>
+      <p:sp>
+        <p:nvSpPr>
+          <p:cNvPr id="55" name="Arc 54"/>
+          <p:cNvSpPr/>
+          <p:nvPr/>
+        </p:nvSpPr>
+        <p:spPr>
+          <a:xfrm rot="20481769" flipH="1">
+            <a:off x="4339521" y="1122033"/>
+            <a:ext cx="3406113" cy="967482"/>
+          </a:xfrm>
+          <a:prstGeom prst="arc">
+            <a:avLst>
+              <a:gd name="adj1" fmla="val 11493923"/>
+              <a:gd name="adj2" fmla="val 21497791"/>
+            </a:avLst>
+          </a:prstGeom>
+          <a:ln w="28575">
+            <a:solidFill>
+              <a:srgbClr val="0070C0"/>
+            </a:solidFill>
+            <a:headEnd type="none"/>
+            <a:tailEnd type="triangle"/>
+          </a:ln>
+        </p:spPr>
+        <p:style>
+          <a:lnRef idx="1">
+            <a:schemeClr val="accent1"/>
+          </a:lnRef>
+          <a:fillRef idx="0">
+            <a:schemeClr val="accent1"/>
+          </a:fillRef>
+          <a:effectRef idx="0">
+            <a:schemeClr val="accent1"/>
+          </a:effectRef>
+          <a:fontRef idx="minor">
+            <a:schemeClr val="tx1"/>
+          </a:fontRef>
+        </p:style>
+        <p:txBody>
+          <a:bodyPr rtlCol="0" anchor="ctr"/>
+          <a:lstStyle/>
+          <a:p>
+            <a:pPr algn="ctr"/>
+            <a:endParaRPr lang="en-US" b="1"/>
+          </a:p>
+        </p:txBody>
+      </p:sp>
+      <p:sp>
+        <p:nvSpPr>
+          <p:cNvPr id="56" name="TextBox 55"/>
+          <p:cNvSpPr txBox="1"/>
+          <p:nvPr/>
+        </p:nvSpPr>
+        <p:spPr>
+          <a:xfrm rot="20513492">
+            <a:off x="5270177" y="925187"/>
+            <a:ext cx="1055178" cy="215444"/>
+          </a:xfrm>
+          <a:prstGeom prst="rect">
+            <a:avLst/>
+          </a:prstGeom>
+          <a:noFill/>
+        </p:spPr>
+        <p:txBody>
+          <a:bodyPr wrap="square" lIns="0" tIns="0" rIns="0" bIns="0" rtlCol="0">
+            <a:spAutoFit/>
+          </a:bodyPr>
+          <a:lstStyle/>
+          <a:p>
+            <a:r>
+              <a:rPr lang="en-US" sz="1400" b="1" dirty="0">
+                <a:solidFill>
+                  <a:srgbClr val="0070C0"/>
+                </a:solidFill>
+              </a:rPr>
+              <a:t>5</a:t>
+            </a:r>
+            <a:r>
+              <a:rPr lang="en-US" sz="1400" b="1" dirty="0" smtClean="0">
+                <a:solidFill>
+                  <a:srgbClr val="0070C0"/>
+                </a:solidFill>
+              </a:rPr>
+              <a:t>. </a:t>
+            </a:r>
+            <a:r>
+              <a:rPr lang="en-US" sz="1400" b="1" dirty="0">
+                <a:solidFill>
+                  <a:srgbClr val="0070C0"/>
+                </a:solidFill>
+              </a:rPr>
+              <a:t>f</a:t>
+            </a:r>
+            <a:r>
+              <a:rPr lang="en-US" sz="1400" b="1" dirty="0" smtClean="0">
+                <a:solidFill>
+                  <a:srgbClr val="0070C0"/>
+                </a:solidFill>
+              </a:rPr>
+              <a:t>inal review</a:t>
+            </a:r>
             <a:endParaRPr lang="en-US" sz="1400" b="1" dirty="0">
               <a:solidFill>
-                <a:srgbClr val="00B050"/>
+                <a:srgbClr val="0070C0"/>
               </a:solidFill>
             </a:endParaRPr>
           </a:p>
@@ -6097,7 +6082,7 @@
     </p:spTree>
     <p:extLst>
       <p:ext uri="{BB962C8B-B14F-4D97-AF65-F5344CB8AC3E}">
-        <p14:creationId xmlns:p14="http://schemas.microsoft.com/office/powerpoint/2010/main" val="2312643091"/>
+        <p14:creationId xmlns:p14="http://schemas.microsoft.com/office/powerpoint/2010/main" val="179394758"/>
       </p:ext>
     </p:extLst>
   </p:cSld>

</xml_diff>